<commit_message>
add icone logo/ic_logo.png and update application
</commit_message>
<xml_diff>
--- a/logo/Présentation1.pptx
+++ b/logo/Présentation1.pptx
@@ -2977,7 +2977,7 @@
         </p:nvSpPr>
         <p:spPr>
           <a:xfrm rot="20524862">
-            <a:off x="4701460" y="2179072"/>
+            <a:off x="1220131" y="1022301"/>
             <a:ext cx="2352068" cy="1303540"/>
           </a:xfrm>
           <a:prstGeom prst="ellipse">
@@ -3033,7 +3033,7 @@
         </p:nvSpPr>
         <p:spPr>
           <a:xfrm rot="20354270">
-            <a:off x="4654049" y="2216568"/>
+            <a:off x="1172720" y="1059797"/>
             <a:ext cx="2249387" cy="954107"/>
           </a:xfrm>
           <a:prstGeom prst="rect">
@@ -3096,7 +3096,7 @@
         </p:nvSpPr>
         <p:spPr>
           <a:xfrm rot="8133459">
-            <a:off x="6034688" y="2651427"/>
+            <a:off x="2553359" y="1494656"/>
             <a:ext cx="969484" cy="358830"/>
           </a:xfrm>
           <a:prstGeom prst="blockArc">
@@ -3139,6 +3139,123 @@
             <a:endParaRPr lang="fr-FR">
               <a:solidFill>
                 <a:schemeClr val="tx1"/>
+              </a:solidFill>
+            </a:endParaRPr>
+          </a:p>
+        </p:txBody>
+      </p:sp>
+      <p:sp>
+        <p:nvSpPr>
+          <p:cNvPr id="7" name="Ellipse 6"/>
+          <p:cNvSpPr/>
+          <p:nvPr/>
+        </p:nvSpPr>
+        <p:spPr>
+          <a:xfrm>
+            <a:off x="4351661" y="2381616"/>
+            <a:ext cx="1123721" cy="1101687"/>
+          </a:xfrm>
+          <a:prstGeom prst="ellipse">
+            <a:avLst/>
+          </a:prstGeom>
+          <a:solidFill>
+            <a:srgbClr val="BF0000"/>
+          </a:solidFill>
+          <a:ln>
+            <a:solidFill>
+              <a:srgbClr val="BF0000"/>
+            </a:solidFill>
+          </a:ln>
+        </p:spPr>
+        <p:style>
+          <a:lnRef idx="2">
+            <a:schemeClr val="accent1">
+              <a:shade val="50000"/>
+            </a:schemeClr>
+          </a:lnRef>
+          <a:fillRef idx="1">
+            <a:schemeClr val="accent1"/>
+          </a:fillRef>
+          <a:effectRef idx="0">
+            <a:schemeClr val="accent1"/>
+          </a:effectRef>
+          <a:fontRef idx="minor">
+            <a:schemeClr val="lt1"/>
+          </a:fontRef>
+        </p:style>
+        <p:txBody>
+          <a:bodyPr rtlCol="0" anchor="ctr"/>
+          <a:lstStyle/>
+          <a:p>
+            <a:pPr algn="ctr"/>
+            <a:endParaRPr lang="fr-FR"/>
+          </a:p>
+        </p:txBody>
+      </p:sp>
+      <p:sp>
+        <p:nvSpPr>
+          <p:cNvPr id="8" name="ZoneTexte 7"/>
+          <p:cNvSpPr txBox="1"/>
+          <p:nvPr/>
+        </p:nvSpPr>
+        <p:spPr>
+          <a:xfrm>
+            <a:off x="3788827" y="2455405"/>
+            <a:ext cx="2249387" cy="954107"/>
+          </a:xfrm>
+          <a:prstGeom prst="rect">
+            <a:avLst/>
+          </a:prstGeom>
+          <a:noFill/>
+          <a:effectLst/>
+        </p:spPr>
+        <p:txBody>
+          <a:bodyPr wrap="square" rtlCol="0">
+            <a:spAutoFit/>
+          </a:bodyPr>
+          <a:lstStyle/>
+          <a:p>
+            <a:pPr algn="ctr"/>
+            <a:r>
+              <a:rPr lang="fr-FR" sz="2800" i="1" dirty="0" smtClean="0">
+                <a:solidFill>
+                  <a:schemeClr val="bg1"/>
+                </a:solidFill>
+                <a:latin typeface="Forte" panose="03060902040502070203" pitchFamily="66" charset="0"/>
+              </a:rPr>
+              <a:t>P</a:t>
+            </a:r>
+            <a:r>
+              <a:rPr lang="fr-FR" sz="2000" i="1" dirty="0" smtClean="0">
+                <a:solidFill>
+                  <a:schemeClr val="bg1"/>
+                </a:solidFill>
+              </a:rPr>
+              <a:t>oster</a:t>
+            </a:r>
+          </a:p>
+          <a:p>
+            <a:pPr algn="ctr"/>
+            <a:r>
+              <a:rPr lang="fr-FR" sz="2800" dirty="0" smtClean="0">
+                <a:solidFill>
+                  <a:schemeClr val="bg1"/>
+                </a:solidFill>
+                <a:latin typeface="Forte" panose="03060902040502070203" pitchFamily="66" charset="0"/>
+              </a:rPr>
+              <a:t>A</a:t>
+            </a:r>
+            <a:r>
+              <a:rPr lang="fr-FR" sz="2000" i="1" dirty="0" smtClean="0">
+                <a:solidFill>
+                  <a:schemeClr val="bg1"/>
+                </a:solidFill>
+              </a:rPr>
+              <a:t>pp</a:t>
+            </a:r>
+            <a:endParaRPr lang="fr-FR" sz="2000" i="1" dirty="0">
+              <a:solidFill>
+                <a:schemeClr val="bg1"/>
               </a:solidFill>
             </a:endParaRPr>
           </a:p>

</xml_diff>